<commit_message>
Updated the ppt for the presentation
</commit_message>
<xml_diff>
--- a/notebook/Robot Obstacle avoidance with reinforcement learning.pptx
+++ b/notebook/Robot Obstacle avoidance with reinforcement learning.pptx
@@ -355,7 +355,7 @@
           <a:p>
             <a:fld id="{ED291B17-9318-49DB-B28B-6E5994AE9581}" type="datetime1">
               <a:rPr lang="en-US" smtClean="0"/>
-              <a:t>8/1/2020</a:t>
+              <a:t>8/2/2020</a:t>
             </a:fld>
             <a:endParaRPr lang="en-US" dirty="0"/>
           </a:p>
@@ -558,7 +558,7 @@
           <a:p>
             <a:fld id="{2CED4963-E985-44C4-B8C4-FDD613B7C2F8}" type="datetime1">
               <a:rPr lang="en-US" smtClean="0"/>
-              <a:t>8/1/2020</a:t>
+              <a:t>8/2/2020</a:t>
             </a:fld>
             <a:endParaRPr lang="en-US" dirty="0"/>
           </a:p>
@@ -920,7 +920,7 @@
           <a:p>
             <a:fld id="{ED291B17-9318-49DB-B28B-6E5994AE9581}" type="datetime1">
               <a:rPr lang="en-US" smtClean="0"/>
-              <a:t>8/1/2020</a:t>
+              <a:t>8/2/2020</a:t>
             </a:fld>
             <a:endParaRPr lang="en-US" dirty="0"/>
           </a:p>
@@ -1118,7 +1118,7 @@
           <a:p>
             <a:fld id="{78DD82B9-B8EE-4375-B6FF-88FA6ABB15D9}" type="datetime1">
               <a:rPr lang="en-US" smtClean="0"/>
-              <a:t>8/1/2020</a:t>
+              <a:t>8/2/2020</a:t>
             </a:fld>
             <a:endParaRPr lang="en-US" dirty="0"/>
           </a:p>
@@ -1430,7 +1430,7 @@
           <a:p>
             <a:fld id="{B2497495-0637-405E-AE64-5CC7506D51F5}" type="datetime1">
               <a:rPr lang="en-US" smtClean="0"/>
-              <a:t>8/1/2020</a:t>
+              <a:t>8/2/2020</a:t>
             </a:fld>
             <a:endParaRPr lang="en-US" dirty="0"/>
           </a:p>
@@ -1683,7 +1683,7 @@
           <a:p>
             <a:fld id="{7BFFD690-9426-415D-8B65-26881E07B2D4}" type="datetime1">
               <a:rPr lang="en-US" smtClean="0"/>
-              <a:t>8/1/2020</a:t>
+              <a:t>8/2/2020</a:t>
             </a:fld>
             <a:endParaRPr lang="en-US" dirty="0"/>
           </a:p>
@@ -2105,7 +2105,7 @@
           <a:p>
             <a:fld id="{04C4989A-474C-40DE-95B9-011C28B71673}" type="datetime1">
               <a:rPr lang="en-US" smtClean="0"/>
-              <a:t>8/1/2020</a:t>
+              <a:t>8/2/2020</a:t>
             </a:fld>
             <a:endParaRPr lang="en-US" dirty="0"/>
           </a:p>
@@ -2228,7 +2228,7 @@
           <a:p>
             <a:fld id="{5DB4ED54-5B5E-4A04-93D3-5772E3CE3818}" type="datetime1">
               <a:rPr lang="en-US" smtClean="0"/>
-              <a:t>8/1/2020</a:t>
+              <a:t>8/2/2020</a:t>
             </a:fld>
             <a:endParaRPr lang="en-US" dirty="0"/>
           </a:p>
@@ -2323,7 +2323,7 @@
           <a:p>
             <a:fld id="{4EDE50D6-574B-40AF-946F-D52A04ADE379}" type="datetime1">
               <a:rPr lang="en-US" smtClean="0"/>
-              <a:t>8/1/2020</a:t>
+              <a:t>8/2/2020</a:t>
             </a:fld>
             <a:endParaRPr lang="en-US" dirty="0"/>
           </a:p>
@@ -2700,7 +2700,7 @@
           <a:p>
             <a:fld id="{D82884F1-FFEA-405F-9602-3DCA865EDA4E}" type="datetime1">
               <a:rPr lang="en-US" smtClean="0"/>
-              <a:t>8/1/2020</a:t>
+              <a:t>8/2/2020</a:t>
             </a:fld>
             <a:endParaRPr lang="en-US" dirty="0"/>
           </a:p>
@@ -2993,7 +2993,7 @@
           <a:p>
             <a:fld id="{7E18DB4A-8810-4A10-AD5C-D5E2C667F5B3}" type="datetime1">
               <a:rPr lang="en-US" smtClean="0"/>
-              <a:t>8/1/2020</a:t>
+              <a:t>8/2/2020</a:t>
             </a:fld>
             <a:endParaRPr lang="en-US" dirty="0"/>
           </a:p>
@@ -3208,7 +3208,7 @@
           <a:p>
             <a:fld id="{ED291B17-9318-49DB-B28B-6E5994AE9581}" type="datetime1">
               <a:rPr lang="en-US" smtClean="0"/>
-              <a:t>8/1/2020</a:t>
+              <a:t>8/2/2020</a:t>
             </a:fld>
             <a:endParaRPr lang="en-US" dirty="0"/>
           </a:p>
@@ -4999,15 +4999,7 @@
           <a:p>
             <a:r>
               <a:rPr lang="en-CA" dirty="0"/>
-              <a:t>Pre-</a:t>
-            </a:r>
-            <a:r>
-              <a:rPr lang="en-CA" dirty="0" err="1"/>
-              <a:t>requisities</a:t>
-            </a:r>
-            <a:r>
-              <a:rPr lang="en-CA" dirty="0"/>
-              <a:t> for setup:</a:t>
+              <a:t>Prerequisite for setup:</a:t>
             </a:r>
           </a:p>
           <a:p>
@@ -5144,17 +5136,370 @@
             </a:pPr>
             <a:r>
               <a:rPr lang="en-CA" dirty="0"/>
-              <a:t>Find the optimal path for robot to reach an end point (goal state) while avoiding randomly generated obstacles in a 2D space</a:t>
-            </a:r>
-          </a:p>
-          <a:p>
-            <a:pPr marL="0" indent="0">
-              <a:buNone/>
+              <a:t>Assumptions:</a:t>
+            </a:r>
+          </a:p>
+          <a:p>
+            <a:pPr marL="342900" indent="-342900">
+              <a:buAutoNum type="alphaLcPeriod"/>
             </a:pPr>
             <a:endParaRPr lang="en-CA" dirty="0"/>
           </a:p>
-        </p:txBody>
-      </p:sp>
+          <a:p>
+            <a:pPr marL="0" indent="0">
+              <a:buNone/>
+            </a:pPr>
+            <a:endParaRPr lang="en-CA" dirty="0"/>
+          </a:p>
+        </p:txBody>
+      </p:sp>
+      <p:graphicFrame>
+        <p:nvGraphicFramePr>
+          <p:cNvPr id="4" name="Table 4">
+            <a:extLst>
+              <a:ext uri="{FF2B5EF4-FFF2-40B4-BE49-F238E27FC236}">
+                <a16:creationId xmlns:a16="http://schemas.microsoft.com/office/drawing/2014/main" id="{B88A1479-5CF4-4DA7-9FE7-2215FB791E1C}"/>
+              </a:ext>
+            </a:extLst>
+          </p:cNvPr>
+          <p:cNvGraphicFramePr>
+            <a:graphicFrameLocks noGrp="1"/>
+          </p:cNvGraphicFramePr>
+          <p:nvPr>
+            <p:extLst>
+              <p:ext uri="{D42A27DB-BD31-4B8C-83A1-F6EECF244321}">
+                <p14:modId xmlns:p14="http://schemas.microsoft.com/office/powerpoint/2010/main" val="913527543"/>
+              </p:ext>
+            </p:extLst>
+          </p:nvPr>
+        </p:nvGraphicFramePr>
+        <p:xfrm>
+          <a:off x="581191" y="1741271"/>
+          <a:ext cx="10947254" cy="1737360"/>
+        </p:xfrm>
+        <a:graphic>
+          <a:graphicData uri="http://schemas.openxmlformats.org/drawingml/2006/table">
+            <a:tbl>
+              <a:tblPr firstRow="1" bandRow="1">
+                <a:tableStyleId>{5C22544A-7EE6-4342-B048-85BDC9FD1C3A}</a:tableStyleId>
+              </a:tblPr>
+              <a:tblGrid>
+                <a:gridCol w="5473627">
+                  <a:extLst>
+                    <a:ext uri="{9D8B030D-6E8A-4147-A177-3AD203B41FA5}">
+                      <a16:colId xmlns:a16="http://schemas.microsoft.com/office/drawing/2014/main" val="507858612"/>
+                    </a:ext>
+                  </a:extLst>
+                </a:gridCol>
+                <a:gridCol w="5473627">
+                  <a:extLst>
+                    <a:ext uri="{9D8B030D-6E8A-4147-A177-3AD203B41FA5}">
+                      <a16:colId xmlns:a16="http://schemas.microsoft.com/office/drawing/2014/main" val="2069053511"/>
+                    </a:ext>
+                  </a:extLst>
+                </a:gridCol>
+              </a:tblGrid>
+              <a:tr h="749680">
+                <a:tc>
+                  <a:txBody>
+                    <a:bodyPr/>
+                    <a:lstStyle/>
+                    <a:p>
+                      <a:pPr marL="342900" indent="-342900" algn="l">
+                        <a:buFont typeface="Arial" panose="020B0604020202020204" pitchFamily="34" charset="0"/>
+                        <a:buChar char="•"/>
+                      </a:pPr>
+                      <a:r>
+                        <a:rPr lang="en-CA" dirty="0"/>
+                        <a:t>500*500 pixels</a:t>
+                      </a:r>
+                    </a:p>
+                    <a:p>
+                      <a:pPr marL="342900" indent="-342900" algn="l">
+                        <a:buFont typeface="Arial" panose="020B0604020202020204" pitchFamily="34" charset="0"/>
+                        <a:buChar char="•"/>
+                      </a:pPr>
+                      <a:r>
+                        <a:rPr lang="en-CA" dirty="0"/>
+                        <a:t>Starting point : top corner(10,10)</a:t>
+                      </a:r>
+                    </a:p>
+                    <a:p>
+                      <a:pPr marL="342900" indent="-342900" algn="l">
+                        <a:buFont typeface="Arial" panose="020B0604020202020204" pitchFamily="34" charset="0"/>
+                        <a:buChar char="•"/>
+                      </a:pPr>
+                      <a:r>
+                        <a:rPr lang="en-CA" dirty="0"/>
+                        <a:t>End point : bottom right corner (450, 450)</a:t>
+                      </a:r>
+                    </a:p>
+                    <a:p>
+                      <a:pPr marL="342900" marR="0" lvl="0" indent="-342900" algn="l" defTabSz="457200" rtl="0" eaLnBrk="1" fontAlgn="auto" latinLnBrk="0" hangingPunct="1">
+                        <a:lnSpc>
+                          <a:spcPct val="100000"/>
+                        </a:lnSpc>
+                        <a:spcBef>
+                          <a:spcPts val="0"/>
+                        </a:spcBef>
+                        <a:spcAft>
+                          <a:spcPts val="0"/>
+                        </a:spcAft>
+                        <a:buClrTx/>
+                        <a:buSzTx/>
+                        <a:buFont typeface="Arial" panose="020B0604020202020204" pitchFamily="34" charset="0"/>
+                        <a:buChar char="•"/>
+                        <a:tabLst/>
+                        <a:defRPr/>
+                      </a:pPr>
+                      <a:r>
+                        <a:rPr lang="en-US" b="0" i="0" dirty="0">
+                          <a:effectLst/>
+                          <a:latin typeface="-apple-system"/>
+                        </a:rPr>
+                        <a:t>Actions(s): Up, Down, Right and left</a:t>
+                      </a:r>
+                    </a:p>
+                    <a:p>
+                      <a:pPr marL="342900" marR="0" lvl="0" indent="-342900" algn="l" defTabSz="457200" rtl="0" eaLnBrk="1" fontAlgn="auto" latinLnBrk="0" hangingPunct="1">
+                        <a:lnSpc>
+                          <a:spcPct val="100000"/>
+                        </a:lnSpc>
+                        <a:spcBef>
+                          <a:spcPts val="0"/>
+                        </a:spcBef>
+                        <a:spcAft>
+                          <a:spcPts val="0"/>
+                        </a:spcAft>
+                        <a:buClrTx/>
+                        <a:buSzTx/>
+                        <a:buFont typeface="Arial" panose="020B0604020202020204" pitchFamily="34" charset="0"/>
+                        <a:buChar char="•"/>
+                        <a:tabLst/>
+                        <a:defRPr/>
+                      </a:pPr>
+                      <a:r>
+                        <a:rPr lang="en-US" b="0" i="0" dirty="0">
+                          <a:effectLst/>
+                          <a:latin typeface="-apple-system"/>
+                        </a:rPr>
+                        <a:t>States: all possible states within a 4 x 4 grid with 0, 1 or 2 obstacles</a:t>
+                      </a:r>
+                      <a:endParaRPr lang="en-CA" dirty="0"/>
+                    </a:p>
+                  </a:txBody>
+                  <a:tcPr/>
+                </a:tc>
+                <a:tc>
+                  <a:txBody>
+                    <a:bodyPr/>
+                    <a:lstStyle/>
+                    <a:p>
+                      <a:pPr marL="342900" indent="-342900" algn="l">
+                        <a:buFont typeface="Arial" panose="020B0604020202020204" pitchFamily="34" charset="0"/>
+                        <a:buChar char="•"/>
+                      </a:pPr>
+                      <a:r>
+                        <a:rPr lang="en-US" b="0" i="0" dirty="0">
+                          <a:effectLst/>
+                          <a:latin typeface="-apple-system"/>
+                        </a:rPr>
+                        <a:t>T(</a:t>
+                      </a:r>
+                      <a:r>
+                        <a:rPr lang="en-US" b="0" i="0" dirty="0" err="1">
+                          <a:effectLst/>
+                          <a:latin typeface="-apple-system"/>
+                        </a:rPr>
+                        <a:t>s'|s</a:t>
+                      </a:r>
+                      <a:r>
+                        <a:rPr lang="en-US" b="0" i="0" dirty="0">
+                          <a:effectLst/>
+                          <a:latin typeface="-apple-system"/>
+                        </a:rPr>
+                        <a:t>; a): probability of s0 if take action a in state s = 1 (No uncertainty)</a:t>
+                      </a:r>
+                    </a:p>
+                    <a:p>
+                      <a:pPr marL="342900" indent="-342900" algn="l">
+                        <a:buFont typeface="Arial" panose="020B0604020202020204" pitchFamily="34" charset="0"/>
+                        <a:buChar char="•"/>
+                      </a:pPr>
+                      <a:r>
+                        <a:rPr lang="en-US" b="0" i="0" dirty="0">
+                          <a:effectLst/>
+                          <a:latin typeface="-apple-system"/>
+                        </a:rPr>
+                        <a:t>Reward(s; a; s0): -1 without </a:t>
+                      </a:r>
+                      <a:r>
+                        <a:rPr lang="en-US" b="0" i="0" dirty="0" err="1">
+                          <a:effectLst/>
+                          <a:latin typeface="-apple-system"/>
+                        </a:rPr>
+                        <a:t>obsctacle</a:t>
+                      </a:r>
+                      <a:r>
+                        <a:rPr lang="en-US" b="0" i="0" dirty="0">
+                          <a:effectLst/>
+                          <a:latin typeface="-apple-system"/>
+                        </a:rPr>
+                        <a:t>, -5 when there is an obstacle</a:t>
+                      </a:r>
+                    </a:p>
+                    <a:p>
+                      <a:pPr marL="342900" indent="-342900" algn="l">
+                        <a:buFont typeface="Arial" panose="020B0604020202020204" pitchFamily="34" charset="0"/>
+                        <a:buChar char="•"/>
+                      </a:pPr>
+                      <a:r>
+                        <a:rPr lang="en-US" b="0" i="0" dirty="0">
+                          <a:effectLst/>
+                          <a:latin typeface="-apple-system"/>
+                        </a:rPr>
+                        <a:t>Discount factor = 0.6</a:t>
+                      </a:r>
+                      <a:endParaRPr lang="en-CA" dirty="0"/>
+                    </a:p>
+                    <a:p>
+                      <a:pPr algn="l"/>
+                      <a:endParaRPr lang="en-CA" dirty="0"/>
+                    </a:p>
+                  </a:txBody>
+                  <a:tcPr/>
+                </a:tc>
+                <a:extLst>
+                  <a:ext uri="{0D108BD9-81ED-4DB2-BD59-A6C34878D82A}">
+                    <a16:rowId xmlns:a16="http://schemas.microsoft.com/office/drawing/2014/main" val="1550774782"/>
+                  </a:ext>
+                </a:extLst>
+              </a:tr>
+            </a:tbl>
+          </a:graphicData>
+        </a:graphic>
+      </p:graphicFrame>
+      <p:sp>
+        <p:nvSpPr>
+          <p:cNvPr id="5" name="TextBox 4">
+            <a:extLst>
+              <a:ext uri="{FF2B5EF4-FFF2-40B4-BE49-F238E27FC236}">
+                <a16:creationId xmlns:a16="http://schemas.microsoft.com/office/drawing/2014/main" id="{EAC0B5CD-EEF8-49AA-B4A5-86CC44171BFD}"/>
+              </a:ext>
+            </a:extLst>
+          </p:cNvPr>
+          <p:cNvSpPr txBox="1"/>
+          <p:nvPr/>
+        </p:nvSpPr>
+        <p:spPr>
+          <a:xfrm>
+            <a:off x="581191" y="3739581"/>
+            <a:ext cx="10947254" cy="1546577"/>
+          </a:xfrm>
+          <a:prstGeom prst="rect">
+            <a:avLst/>
+          </a:prstGeom>
+          <a:noFill/>
+        </p:spPr>
+        <p:txBody>
+          <a:bodyPr wrap="square" rtlCol="0">
+            <a:spAutoFit/>
+          </a:bodyPr>
+          <a:lstStyle/>
+          <a:p>
+            <a:r>
+              <a:rPr lang="en-CA" sz="1050" dirty="0"/>
+              <a:t>Sample policy : </a:t>
+            </a:r>
+            <a:r>
+              <a:rPr lang="en-CA" sz="1050" dirty="0" err="1"/>
+              <a:t>policy_key</a:t>
+            </a:r>
+            <a:r>
+              <a:rPr lang="en-CA" sz="1050" dirty="0"/>
+              <a:t>=(3, 0)|[]</a:t>
+            </a:r>
+          </a:p>
+          <a:p>
+            <a:r>
+              <a:rPr lang="en-CA" sz="1050" dirty="0"/>
+              <a:t>---------------------------</a:t>
+            </a:r>
+          </a:p>
+          <a:p>
+            <a:r>
+              <a:rPr lang="en-CA" sz="1050" dirty="0"/>
+              <a:t>-1.00|-1.00|-1.00|-1.00|</a:t>
+            </a:r>
+          </a:p>
+          <a:p>
+            <a:r>
+              <a:rPr lang="en-CA" sz="1050" dirty="0"/>
+              <a:t>---------------------------</a:t>
+            </a:r>
+          </a:p>
+          <a:p>
+            <a:r>
+              <a:rPr lang="en-CA" sz="1050" dirty="0"/>
+              <a:t>-1.00|-1.00|-1.00|-1.00|</a:t>
+            </a:r>
+          </a:p>
+          <a:p>
+            <a:r>
+              <a:rPr lang="en-CA" sz="1050" dirty="0"/>
+              <a:t>---------------------------</a:t>
+            </a:r>
+          </a:p>
+          <a:p>
+            <a:r>
+              <a:rPr lang="en-CA" sz="1050" dirty="0"/>
+              <a:t>-1.00|-1.00|-1.00|-1.00|</a:t>
+            </a:r>
+          </a:p>
+          <a:p>
+            <a:r>
+              <a:rPr lang="en-CA" sz="1050" dirty="0"/>
+              <a:t>---------------------------</a:t>
+            </a:r>
+          </a:p>
+          <a:p>
+            <a:r>
+              <a:rPr lang="en-CA" sz="1050" dirty="0"/>
+              <a:t> 0.00|-1.00|-1.00|-1.00|</a:t>
+            </a:r>
+          </a:p>
+        </p:txBody>
+      </p:sp>
+      <p:pic>
+        <p:nvPicPr>
+          <p:cNvPr id="6" name="Picture 5">
+            <a:extLst>
+              <a:ext uri="{FF2B5EF4-FFF2-40B4-BE49-F238E27FC236}">
+                <a16:creationId xmlns:a16="http://schemas.microsoft.com/office/drawing/2014/main" id="{331A6890-C39A-4788-B9FF-37DC362C1BFB}"/>
+              </a:ext>
+            </a:extLst>
+          </p:cNvPr>
+          <p:cNvPicPr>
+            <a:picLocks noChangeAspect="1"/>
+          </p:cNvPicPr>
+          <p:nvPr/>
+        </p:nvPicPr>
+        <p:blipFill>
+          <a:blip r:embed="rId2"/>
+          <a:stretch>
+            <a:fillRect/>
+          </a:stretch>
+        </p:blipFill>
+        <p:spPr>
+          <a:xfrm>
+            <a:off x="5022235" y="3661964"/>
+            <a:ext cx="4301451" cy="3018318"/>
+          </a:xfrm>
+          <a:prstGeom prst="rect">
+            <a:avLst/>
+          </a:prstGeom>
+        </p:spPr>
+      </p:pic>
     </p:spTree>
     <p:extLst>
       <p:ext uri="{BB962C8B-B14F-4D97-AF65-F5344CB8AC3E}">
@@ -5236,8 +5581,8 @@
         </p:nvSpPr>
         <p:spPr>
           <a:xfrm>
-            <a:off x="581192" y="1348577"/>
-            <a:ext cx="11029615" cy="4626774"/>
+            <a:off x="581192" y="3342289"/>
+            <a:ext cx="11029615" cy="2633061"/>
           </a:xfrm>
         </p:spPr>
         <p:txBody>
@@ -5260,6 +5605,232 @@
           </a:p>
         </p:txBody>
       </p:sp>
+      <p:graphicFrame>
+        <p:nvGraphicFramePr>
+          <p:cNvPr id="5" name="Table 4">
+            <a:extLst>
+              <a:ext uri="{FF2B5EF4-FFF2-40B4-BE49-F238E27FC236}">
+                <a16:creationId xmlns:a16="http://schemas.microsoft.com/office/drawing/2014/main" id="{BFC19AC6-6895-4B65-8744-43C91BA5ED44}"/>
+              </a:ext>
+            </a:extLst>
+          </p:cNvPr>
+          <p:cNvGraphicFramePr>
+            <a:graphicFrameLocks noGrp="1"/>
+          </p:cNvGraphicFramePr>
+          <p:nvPr>
+            <p:extLst>
+              <p:ext uri="{D42A27DB-BD31-4B8C-83A1-F6EECF244321}">
+                <p14:modId xmlns:p14="http://schemas.microsoft.com/office/powerpoint/2010/main" val="3037599879"/>
+              </p:ext>
+            </p:extLst>
+          </p:nvPr>
+        </p:nvGraphicFramePr>
+        <p:xfrm>
+          <a:off x="581192" y="1348576"/>
+          <a:ext cx="10947254" cy="1737360"/>
+        </p:xfrm>
+        <a:graphic>
+          <a:graphicData uri="http://schemas.openxmlformats.org/drawingml/2006/table">
+            <a:tbl>
+              <a:tblPr firstRow="1" bandRow="1">
+                <a:tableStyleId>{5C22544A-7EE6-4342-B048-85BDC9FD1C3A}</a:tableStyleId>
+              </a:tblPr>
+              <a:tblGrid>
+                <a:gridCol w="5473627">
+                  <a:extLst>
+                    <a:ext uri="{9D8B030D-6E8A-4147-A177-3AD203B41FA5}">
+                      <a16:colId xmlns:a16="http://schemas.microsoft.com/office/drawing/2014/main" val="507858612"/>
+                    </a:ext>
+                  </a:extLst>
+                </a:gridCol>
+                <a:gridCol w="5473627">
+                  <a:extLst>
+                    <a:ext uri="{9D8B030D-6E8A-4147-A177-3AD203B41FA5}">
+                      <a16:colId xmlns:a16="http://schemas.microsoft.com/office/drawing/2014/main" val="2069053511"/>
+                    </a:ext>
+                  </a:extLst>
+                </a:gridCol>
+              </a:tblGrid>
+              <a:tr h="749680">
+                <a:tc>
+                  <a:txBody>
+                    <a:bodyPr/>
+                    <a:lstStyle/>
+                    <a:p>
+                      <a:pPr marL="342900" indent="-342900" algn="l">
+                        <a:buFont typeface="Arial" panose="020B0604020202020204" pitchFamily="34" charset="0"/>
+                        <a:buChar char="•"/>
+                      </a:pPr>
+                      <a:r>
+                        <a:rPr lang="en-CA" dirty="0"/>
+                        <a:t>500*500 pixels</a:t>
+                      </a:r>
+                    </a:p>
+                    <a:p>
+                      <a:pPr marL="342900" indent="-342900" algn="l">
+                        <a:buFont typeface="Arial" panose="020B0604020202020204" pitchFamily="34" charset="0"/>
+                        <a:buChar char="•"/>
+                      </a:pPr>
+                      <a:r>
+                        <a:rPr lang="en-CA" dirty="0"/>
+                        <a:t>Starting point : top corner(10,10)</a:t>
+                      </a:r>
+                    </a:p>
+                    <a:p>
+                      <a:pPr marL="342900" indent="-342900" algn="l">
+                        <a:buFont typeface="Arial" panose="020B0604020202020204" pitchFamily="34" charset="0"/>
+                        <a:buChar char="•"/>
+                      </a:pPr>
+                      <a:r>
+                        <a:rPr lang="en-CA" dirty="0"/>
+                        <a:t>End point : bottom right corner (450, 450)</a:t>
+                      </a:r>
+                    </a:p>
+                    <a:p>
+                      <a:pPr marL="342900" marR="0" lvl="0" indent="-342900" algn="l" defTabSz="457200" rtl="0" eaLnBrk="1" fontAlgn="auto" latinLnBrk="0" hangingPunct="1">
+                        <a:lnSpc>
+                          <a:spcPct val="100000"/>
+                        </a:lnSpc>
+                        <a:spcBef>
+                          <a:spcPts val="0"/>
+                        </a:spcBef>
+                        <a:spcAft>
+                          <a:spcPts val="0"/>
+                        </a:spcAft>
+                        <a:buClrTx/>
+                        <a:buSzTx/>
+                        <a:buFont typeface="Arial" panose="020B0604020202020204" pitchFamily="34" charset="0"/>
+                        <a:buChar char="•"/>
+                        <a:tabLst/>
+                        <a:defRPr/>
+                      </a:pPr>
+                      <a:r>
+                        <a:rPr lang="en-US" b="0" i="0" dirty="0">
+                          <a:effectLst/>
+                          <a:latin typeface="-apple-system"/>
+                        </a:rPr>
+                        <a:t>Actions(s): Up, Down, Right and left</a:t>
+                      </a:r>
+                    </a:p>
+                    <a:p>
+                      <a:pPr marL="342900" marR="0" lvl="0" indent="-342900" algn="l" defTabSz="457200" rtl="0" eaLnBrk="1" fontAlgn="auto" latinLnBrk="0" hangingPunct="1">
+                        <a:lnSpc>
+                          <a:spcPct val="100000"/>
+                        </a:lnSpc>
+                        <a:spcBef>
+                          <a:spcPts val="0"/>
+                        </a:spcBef>
+                        <a:spcAft>
+                          <a:spcPts val="0"/>
+                        </a:spcAft>
+                        <a:buClrTx/>
+                        <a:buSzTx/>
+                        <a:buFont typeface="Arial" panose="020B0604020202020204" pitchFamily="34" charset="0"/>
+                        <a:buChar char="•"/>
+                        <a:tabLst/>
+                        <a:defRPr/>
+                      </a:pPr>
+                      <a:r>
+                        <a:rPr lang="en-US" b="0" i="0" dirty="0">
+                          <a:effectLst/>
+                          <a:latin typeface="-apple-system"/>
+                        </a:rPr>
+                        <a:t>States: all possible states within a 4 x 4 grid with 0, 1 or 2 obstacles</a:t>
+                      </a:r>
+                      <a:endParaRPr lang="en-CA" dirty="0"/>
+                    </a:p>
+                  </a:txBody>
+                  <a:tcPr/>
+                </a:tc>
+                <a:tc>
+                  <a:txBody>
+                    <a:bodyPr/>
+                    <a:lstStyle/>
+                    <a:p>
+                      <a:pPr marL="342900" indent="-342900" algn="l">
+                        <a:buFont typeface="Arial" panose="020B0604020202020204" pitchFamily="34" charset="0"/>
+                        <a:buChar char="•"/>
+                      </a:pPr>
+                      <a:r>
+                        <a:rPr lang="en-US" b="0" i="0" dirty="0">
+                          <a:effectLst/>
+                          <a:latin typeface="-apple-system"/>
+                        </a:rPr>
+                        <a:t>T(</a:t>
+                      </a:r>
+                      <a:r>
+                        <a:rPr lang="en-US" b="0" i="0" dirty="0" err="1">
+                          <a:effectLst/>
+                          <a:latin typeface="-apple-system"/>
+                        </a:rPr>
+                        <a:t>s'|s</a:t>
+                      </a:r>
+                      <a:r>
+                        <a:rPr lang="en-US" b="0" i="0" dirty="0">
+                          <a:effectLst/>
+                          <a:latin typeface="-apple-system"/>
+                        </a:rPr>
+                        <a:t>; a): probability of s0 if take action a in state s = 1 (No uncertainty)</a:t>
+                      </a:r>
+                    </a:p>
+                    <a:p>
+                      <a:pPr marL="342900" indent="-342900" algn="l">
+                        <a:buFont typeface="Arial" panose="020B0604020202020204" pitchFamily="34" charset="0"/>
+                        <a:buChar char="•"/>
+                      </a:pPr>
+                      <a:r>
+                        <a:rPr lang="en-US" b="0" i="0" dirty="0">
+                          <a:effectLst/>
+                          <a:latin typeface="-apple-system"/>
+                        </a:rPr>
+                        <a:t>Reward(s; a; s0): -1 without </a:t>
+                      </a:r>
+                      <a:r>
+                        <a:rPr lang="en-US" b="0" i="0" dirty="0" err="1">
+                          <a:effectLst/>
+                          <a:latin typeface="-apple-system"/>
+                        </a:rPr>
+                        <a:t>obsctacle</a:t>
+                      </a:r>
+                      <a:r>
+                        <a:rPr lang="en-US" b="0" i="0" dirty="0">
+                          <a:effectLst/>
+                          <a:latin typeface="-apple-system"/>
+                        </a:rPr>
+                        <a:t>, -5 when there is an obstacle</a:t>
+                      </a:r>
+                    </a:p>
+                    <a:p>
+                      <a:pPr marL="342900" indent="-342900" algn="l">
+                        <a:buFont typeface="Arial" panose="020B0604020202020204" pitchFamily="34" charset="0"/>
+                        <a:buChar char="•"/>
+                      </a:pPr>
+                      <a:r>
+                        <a:rPr lang="en-US" b="0" i="0" dirty="0">
+                          <a:effectLst/>
+                          <a:latin typeface="-apple-system"/>
+                        </a:rPr>
+                        <a:t>Discount factor = 0.6</a:t>
+                      </a:r>
+                      <a:endParaRPr lang="en-CA" dirty="0"/>
+                    </a:p>
+                    <a:p>
+                      <a:pPr algn="l"/>
+                      <a:endParaRPr lang="en-CA" dirty="0"/>
+                    </a:p>
+                  </a:txBody>
+                  <a:tcPr/>
+                </a:tc>
+                <a:extLst>
+                  <a:ext uri="{0D108BD9-81ED-4DB2-BD59-A6C34878D82A}">
+                    <a16:rowId xmlns:a16="http://schemas.microsoft.com/office/drawing/2014/main" val="1550774782"/>
+                  </a:ext>
+                </a:extLst>
+              </a:tr>
+            </a:tbl>
+          </a:graphicData>
+        </a:graphic>
+      </p:graphicFrame>
     </p:spTree>
     <p:extLst>
       <p:ext uri="{BB962C8B-B14F-4D97-AF65-F5344CB8AC3E}">
@@ -5648,24 +6219,6 @@
 </file>
 
 <file path=customXml/item1.xml><?xml version="1.0" encoding="utf-8"?>
-<p:properties xmlns:p="http://schemas.microsoft.com/office/2006/metadata/properties" xmlns:xsi="http://www.w3.org/2001/XMLSchema-instance" xmlns:pc="http://schemas.microsoft.com/office/infopath/2007/PartnerControls">
-  <documentManagement>
-    <Status xmlns="71af3243-3dd4-4a8d-8c0d-dd76da1f02a5">Not started</Status>
-    <MediaServiceKeyPoints xmlns="71af3243-3dd4-4a8d-8c0d-dd76da1f02a5" xsi:nil="true"/>
-  </documentManagement>
-</p:properties>
-</file>
-
-<file path=customXml/item2.xml><?xml version="1.0" encoding="utf-8"?>
-<?mso-contentType ?>
-<FormTemplates xmlns="http://schemas.microsoft.com/sharepoint/v3/contenttype/forms">
-  <Display>DocumentLibraryForm</Display>
-  <Edit>DocumentLibraryForm</Edit>
-  <New>DocumentLibraryForm</New>
-</FormTemplates>
-</file>
-
-<file path=customXml/item3.xml><?xml version="1.0" encoding="utf-8"?>
 <ct:contentTypeSchema xmlns:ct="http://schemas.microsoft.com/office/2006/metadata/contentType" xmlns:ma="http://schemas.microsoft.com/office/2006/metadata/properties/metaAttributes" ct:_="" ma:_="" ma:contentTypeName="Document" ma:contentTypeID="0x01010079F111ED35F8CC479449609E8A0923A6" ma:contentTypeVersion="12" ma:contentTypeDescription="Create a new document." ma:contentTypeScope="" ma:versionID="a410dd7f93c95333ffa1b60ed6adedd1">
   <xsd:schema xmlns:xsd="http://www.w3.org/2001/XMLSchema" xmlns:xs="http://www.w3.org/2001/XMLSchema" xmlns:p="http://schemas.microsoft.com/office/2006/metadata/properties" xmlns:ns2="71af3243-3dd4-4a8d-8c0d-dd76da1f02a5" xmlns:ns3="16c05727-aa75-4e4a-9b5f-8a80a1165891" targetNamespace="http://schemas.microsoft.com/office/2006/metadata/properties" ma:root="true" ma:fieldsID="a936d9baba76aa3866493feff160faab" ns2:_="" ns3:_="">
     <xsd:import namespace="71af3243-3dd4-4a8d-8c0d-dd76da1f02a5"/>
@@ -5886,25 +6439,25 @@
 </ct:contentTypeSchema>
 </file>
 
-<file path=customXml/itemProps1.xml><?xml version="1.0" encoding="utf-8"?>
-<ds:datastoreItem xmlns:ds="http://schemas.openxmlformats.org/officeDocument/2006/customXml" ds:itemID="{8D289AE2-D2AE-49D1-AFAC-3A79F6794255}">
-  <ds:schemaRefs>
-    <ds:schemaRef ds:uri="http://schemas.microsoft.com/office/2006/metadata/properties"/>
-    <ds:schemaRef ds:uri="http://schemas.microsoft.com/office/infopath/2007/PartnerControls"/>
-    <ds:schemaRef ds:uri="71af3243-3dd4-4a8d-8c0d-dd76da1f02a5"/>
-  </ds:schemaRefs>
-</ds:datastoreItem>
+<file path=customXml/item2.xml><?xml version="1.0" encoding="utf-8"?>
+<?mso-contentType ?>
+<FormTemplates xmlns="http://schemas.microsoft.com/sharepoint/v3/contenttype/forms">
+  <Display>DocumentLibraryForm</Display>
+  <Edit>DocumentLibraryForm</Edit>
+  <New>DocumentLibraryForm</New>
+</FormTemplates>
 </file>
 
-<file path=customXml/itemProps2.xml><?xml version="1.0" encoding="utf-8"?>
-<ds:datastoreItem xmlns:ds="http://schemas.openxmlformats.org/officeDocument/2006/customXml" ds:itemID="{927BD4C1-B6B1-4715-ABF9-E660A51A4EA0}">
-  <ds:schemaRefs>
-    <ds:schemaRef ds:uri="http://schemas.microsoft.com/sharepoint/v3/contenttype/forms"/>
-  </ds:schemaRefs>
-</ds:datastoreItem>
+<file path=customXml/item3.xml><?xml version="1.0" encoding="utf-8"?>
+<p:properties xmlns:p="http://schemas.microsoft.com/office/2006/metadata/properties" xmlns:xsi="http://www.w3.org/2001/XMLSchema-instance" xmlns:pc="http://schemas.microsoft.com/office/infopath/2007/PartnerControls">
+  <documentManagement>
+    <Status xmlns="71af3243-3dd4-4a8d-8c0d-dd76da1f02a5">Not started</Status>
+    <MediaServiceKeyPoints xmlns="71af3243-3dd4-4a8d-8c0d-dd76da1f02a5" xsi:nil="true"/>
+  </documentManagement>
+</p:properties>
 </file>
 
-<file path=customXml/itemProps3.xml><?xml version="1.0" encoding="utf-8"?>
+<file path=customXml/itemProps1.xml><?xml version="1.0" encoding="utf-8"?>
 <ds:datastoreItem xmlns:ds="http://schemas.openxmlformats.org/officeDocument/2006/customXml" ds:itemID="{41E7CA09-9778-4414-AE97-8064B12DA30E}">
   <ds:schemaRefs>
     <ds:schemaRef ds:uri="http://schemas.microsoft.com/office/2006/metadata/contentType"/>
@@ -5921,4 +6474,22 @@
     <ds:schemaRef ds:uri="http://schemas.microsoft.com/internal/obd"/>
   </ds:schemaRefs>
 </ds:datastoreItem>
+</file>
+
+<file path=customXml/itemProps2.xml><?xml version="1.0" encoding="utf-8"?>
+<ds:datastoreItem xmlns:ds="http://schemas.openxmlformats.org/officeDocument/2006/customXml" ds:itemID="{927BD4C1-B6B1-4715-ABF9-E660A51A4EA0}">
+  <ds:schemaRefs>
+    <ds:schemaRef ds:uri="http://schemas.microsoft.com/sharepoint/v3/contenttype/forms"/>
+  </ds:schemaRefs>
+</ds:datastoreItem>
+</file>
+
+<file path=customXml/itemProps3.xml><?xml version="1.0" encoding="utf-8"?>
+<ds:datastoreItem xmlns:ds="http://schemas.openxmlformats.org/officeDocument/2006/customXml" ds:itemID="{8D289AE2-D2AE-49D1-AFAC-3A79F6794255}">
+  <ds:schemaRefs>
+    <ds:schemaRef ds:uri="http://schemas.microsoft.com/office/2006/metadata/properties"/>
+    <ds:schemaRef ds:uri="http://schemas.microsoft.com/office/infopath/2007/PartnerControls"/>
+    <ds:schemaRef ds:uri="71af3243-3dd4-4a8d-8c0d-dd76da1f02a5"/>
+  </ds:schemaRefs>
+</ds:datastoreItem>
 </file>
</xml_diff>

<commit_message>
Updated the presentation slides
</commit_message>
<xml_diff>
--- a/notebook/Robot Obstacle avoidance with reinforcement learning.pptx
+++ b/notebook/Robot Obstacle avoidance with reinforcement learning.pptx
@@ -8,9 +8,12 @@
     <p:sldId id="257" r:id="rId5"/>
     <p:sldId id="259" r:id="rId6"/>
     <p:sldId id="260" r:id="rId7"/>
-    <p:sldId id="261" r:id="rId8"/>
-    <p:sldId id="263" r:id="rId9"/>
-    <p:sldId id="262" r:id="rId10"/>
+    <p:sldId id="266" r:id="rId8"/>
+    <p:sldId id="261" r:id="rId9"/>
+    <p:sldId id="263" r:id="rId10"/>
+    <p:sldId id="264" r:id="rId11"/>
+    <p:sldId id="265" r:id="rId12"/>
+    <p:sldId id="262" r:id="rId13"/>
   </p:sldIdLst>
   <p:sldSz cx="12192000" cy="6858000"/>
   <p:notesSz cx="6858000" cy="9144000"/>
@@ -4248,21 +4251,8 @@
                   <a:schemeClr val="accent2"/>
                 </a:solidFill>
               </a:rPr>
-              <a:t>Haitham </a:t>
-            </a:r>
-            <a:r>
-              <a:rPr lang="en-CA" dirty="0" err="1">
-                <a:solidFill>
-                  <a:schemeClr val="accent2"/>
-                </a:solidFill>
-              </a:rPr>
-              <a:t>Alamri</a:t>
-            </a:r>
-            <a:endParaRPr lang="en-CA" dirty="0">
-              <a:solidFill>
-                <a:schemeClr val="accent2"/>
-              </a:solidFill>
-            </a:endParaRPr>
+              <a:t>Haitham Alamri</a:t>
+            </a:r>
           </a:p>
           <a:p>
             <a:pPr marL="342900" indent="-342900">
@@ -4699,32 +4689,6 @@
             <a:pPr marL="0" indent="0">
               <a:buNone/>
             </a:pPr>
-            <a:r>
-              <a:rPr lang="en-CA" dirty="0">
-                <a:solidFill>
-                  <a:srgbClr val="FFFFFF"/>
-                </a:solidFill>
-              </a:rPr>
-              <a:t>Reference : </a:t>
-            </a:r>
-            <a:r>
-              <a:rPr lang="en-CA" b="0" i="0" u="none" strike="noStrike" dirty="0">
-                <a:effectLst/>
-                <a:latin typeface="-apple-system"/>
-                <a:hlinkClick r:id="rId2"/>
-              </a:rPr>
-              <a:t>https://bayesianadventures.wordpress.com/2015/08/31/obstacle-avoidance-for-clever-robots/</a:t>
-            </a:r>
-            <a:endParaRPr lang="en-CA" dirty="0">
-              <a:solidFill>
-                <a:srgbClr val="FFFFFF"/>
-              </a:solidFill>
-            </a:endParaRPr>
-          </a:p>
-          <a:p>
-            <a:pPr marL="0" indent="0">
-              <a:buNone/>
-            </a:pPr>
             <a:endParaRPr lang="en-CA" dirty="0">
               <a:solidFill>
                 <a:srgbClr val="FFFFFF"/>
@@ -4748,7 +4712,7 @@
           <p:nvPr/>
         </p:nvPicPr>
         <p:blipFill>
-          <a:blip r:embed="rId3">
+          <a:blip r:embed="rId2">
             <a:extLst>
               <a:ext uri="{28A0092B-C50C-407E-A947-70E740481C1C}">
                 <a14:useLocalDpi xmlns:a14="http://schemas.microsoft.com/office/drawing/2010/main" val="0"/>
@@ -4837,7 +4801,7 @@
           <a:p>
             <a:r>
               <a:rPr lang="en-CA" dirty="0"/>
-              <a:t>Background</a:t>
+              <a:t>Environment</a:t>
             </a:r>
           </a:p>
         </p:txBody>
@@ -4873,17 +4837,7 @@
             </a:pPr>
             <a:r>
               <a:rPr lang="en-CA" dirty="0"/>
-              <a:t>Original Environment simulation created on </a:t>
-            </a:r>
-            <a:r>
-              <a:rPr lang="en-CA" dirty="0" err="1">
-                <a:hlinkClick r:id="rId2"/>
-              </a:rPr>
-              <a:t>codeskulptor</a:t>
-            </a:r>
-            <a:r>
-              <a:rPr lang="en-CA" dirty="0"/>
-              <a:t> </a:t>
+              <a:t>Environment simulation using python 3 for the project</a:t>
             </a:r>
           </a:p>
           <a:p>
@@ -4909,7 +4863,7 @@
           <p:nvPr/>
         </p:nvPicPr>
         <p:blipFill>
-          <a:blip r:embed="rId3"/>
+          <a:blip r:embed="rId2"/>
           <a:stretch>
             <a:fillRect/>
           </a:stretch>
@@ -4938,8 +4892,8 @@
         </p:nvSpPr>
         <p:spPr>
           <a:xfrm>
-            <a:off x="6888892" y="2045043"/>
-            <a:ext cx="4843849" cy="4247317"/>
+            <a:off x="6766958" y="1728034"/>
+            <a:ext cx="4843849" cy="5078313"/>
           </a:xfrm>
           <a:prstGeom prst="rect">
             <a:avLst/>
@@ -4953,8 +4907,8 @@
           <a:lstStyle/>
           <a:p>
             <a:r>
-              <a:rPr lang="en-CA" dirty="0"/>
-              <a:t>How to play :</a:t>
+              <a:rPr lang="en-CA" b="1" i="1" u="sng" dirty="0"/>
+              <a:t>Simulation Steps:</a:t>
             </a:r>
           </a:p>
           <a:p>
@@ -4963,7 +4917,7 @@
             </a:pPr>
             <a:r>
               <a:rPr lang="en-CA" dirty="0"/>
-              <a:t>Choose the staring point of the robot</a:t>
+              <a:t>Choose the starting coordinates of the robot</a:t>
             </a:r>
           </a:p>
           <a:p>
@@ -4972,7 +4926,7 @@
             </a:pPr>
             <a:r>
               <a:rPr lang="en-CA" dirty="0"/>
-              <a:t>Choose the goal</a:t>
+              <a:t>Choose the target coordinates</a:t>
             </a:r>
           </a:p>
           <a:p>
@@ -4981,7 +4935,7 @@
             </a:pPr>
             <a:r>
               <a:rPr lang="en-CA" dirty="0"/>
-              <a:t>Define obstacles</a:t>
+              <a:t>Define static obstacles – generated randomly for each episode</a:t>
             </a:r>
           </a:p>
           <a:p>
@@ -4990,16 +4944,7 @@
             </a:pPr>
             <a:r>
               <a:rPr lang="en-CA" dirty="0"/>
-              <a:t>Navigate the path using the step and avoid any incoming obstacles while navigating towards the target state.</a:t>
-            </a:r>
-          </a:p>
-          <a:p>
-            <a:endParaRPr lang="en-CA" dirty="0"/>
-          </a:p>
-          <a:p>
-            <a:r>
-              <a:rPr lang="en-CA" dirty="0"/>
-              <a:t>Prerequisite for setup:</a:t>
+              <a:t>Define number of sensors on the robot</a:t>
             </a:r>
           </a:p>
           <a:p>
@@ -5008,24 +4953,7 @@
             </a:pPr>
             <a:r>
               <a:rPr lang="en-CA" dirty="0"/>
-              <a:t>Converted </a:t>
-            </a:r>
-            <a:r>
-              <a:rPr lang="en-CA" dirty="0" err="1"/>
-              <a:t>codeskulptor</a:t>
-            </a:r>
-            <a:r>
-              <a:rPr lang="en-CA" dirty="0"/>
-              <a:t> to run on python3 in local environment</a:t>
-            </a:r>
-          </a:p>
-          <a:p>
-            <a:pPr marL="342900" indent="-342900">
-              <a:buAutoNum type="arabicPeriod"/>
-            </a:pPr>
-            <a:r>
-              <a:rPr lang="en-CA" dirty="0"/>
-              <a:t>Understand the Bayesian working of the module.</a:t>
+              <a:t>Navigate the path using the step and avoid any incoming obstacles while navigating towards the target state.</a:t>
             </a:r>
           </a:p>
           <a:p>
@@ -5035,10 +4963,75 @@
             <a:endParaRPr lang="en-CA" dirty="0"/>
           </a:p>
           <a:p>
+            <a:r>
+              <a:rPr lang="en-CA" b="1" i="1" u="sng" dirty="0"/>
+              <a:t>Objectives:</a:t>
+            </a:r>
+          </a:p>
+          <a:p>
+            <a:pPr marL="342900" indent="-342900">
+              <a:buAutoNum type="arabicPeriod"/>
+            </a:pPr>
+            <a:r>
+              <a:rPr lang="en-CA" dirty="0"/>
+              <a:t>Identify and optimize the algorithm to avoid the obstacle and reach the destination in least amount of steps</a:t>
+            </a:r>
+          </a:p>
+          <a:p>
+            <a:pPr marL="342900" indent="-342900">
+              <a:buAutoNum type="arabicPeriod"/>
+            </a:pPr>
+            <a:r>
+              <a:rPr lang="en-CA" dirty="0"/>
+              <a:t>Compare the efficiency of algorithms against each other.</a:t>
+            </a:r>
+          </a:p>
+          <a:p>
             <a:pPr marL="342900" indent="-342900">
               <a:buAutoNum type="arabicPeriod"/>
             </a:pPr>
             <a:endParaRPr lang="en-CA" dirty="0"/>
+          </a:p>
+          <a:p>
+            <a:pPr marL="342900" indent="-342900">
+              <a:buAutoNum type="arabicPeriod"/>
+            </a:pPr>
+            <a:endParaRPr lang="en-CA" dirty="0"/>
+          </a:p>
+        </p:txBody>
+      </p:sp>
+      <p:sp>
+        <p:nvSpPr>
+          <p:cNvPr id="4" name="TextBox 3">
+            <a:extLst>
+              <a:ext uri="{FF2B5EF4-FFF2-40B4-BE49-F238E27FC236}">
+                <a16:creationId xmlns:a16="http://schemas.microsoft.com/office/drawing/2014/main" id="{7912F285-95F3-4699-AFE4-C8E4B5BA91B2}"/>
+              </a:ext>
+            </a:extLst>
+          </p:cNvPr>
+          <p:cNvSpPr txBox="1"/>
+          <p:nvPr/>
+        </p:nvSpPr>
+        <p:spPr>
+          <a:xfrm>
+            <a:off x="581192" y="6214404"/>
+            <a:ext cx="4545812" cy="369332"/>
+          </a:xfrm>
+          <a:prstGeom prst="rect">
+            <a:avLst/>
+          </a:prstGeom>
+          <a:noFill/>
+        </p:spPr>
+        <p:txBody>
+          <a:bodyPr wrap="square" rtlCol="0">
+            <a:spAutoFit/>
+          </a:bodyPr>
+          <a:lstStyle/>
+          <a:p>
+            <a:r>
+              <a:rPr lang="en-CA" dirty="0"/>
+              <a:t>*sample screen shot</a:t>
+            </a:r>
           </a:p>
         </p:txBody>
       </p:sp>
@@ -5100,7 +5093,577 @@
           <a:p>
             <a:r>
               <a:rPr lang="en-CA" dirty="0"/>
-              <a:t>Approach - 1</a:t>
+              <a:t>Solution Approach</a:t>
+            </a:r>
+          </a:p>
+        </p:txBody>
+      </p:sp>
+      <p:graphicFrame>
+        <p:nvGraphicFramePr>
+          <p:cNvPr id="5" name="Table 4">
+            <a:extLst>
+              <a:ext uri="{FF2B5EF4-FFF2-40B4-BE49-F238E27FC236}">
+                <a16:creationId xmlns:a16="http://schemas.microsoft.com/office/drawing/2014/main" id="{BFC19AC6-6895-4B65-8744-43C91BA5ED44}"/>
+              </a:ext>
+            </a:extLst>
+          </p:cNvPr>
+          <p:cNvGraphicFramePr>
+            <a:graphicFrameLocks noGrp="1"/>
+          </p:cNvGraphicFramePr>
+          <p:nvPr>
+            <p:extLst>
+              <p:ext uri="{D42A27DB-BD31-4B8C-83A1-F6EECF244321}">
+                <p14:modId xmlns:p14="http://schemas.microsoft.com/office/powerpoint/2010/main" val="47996031"/>
+              </p:ext>
+            </p:extLst>
+          </p:nvPr>
+        </p:nvGraphicFramePr>
+        <p:xfrm>
+          <a:off x="581192" y="1348575"/>
+          <a:ext cx="10947254" cy="2834640"/>
+        </p:xfrm>
+        <a:graphic>
+          <a:graphicData uri="http://schemas.openxmlformats.org/drawingml/2006/table">
+            <a:tbl>
+              <a:tblPr firstRow="1" bandRow="1">
+                <a:tableStyleId>{5C22544A-7EE6-4342-B048-85BDC9FD1C3A}</a:tableStyleId>
+              </a:tblPr>
+              <a:tblGrid>
+                <a:gridCol w="5473627">
+                  <a:extLst>
+                    <a:ext uri="{9D8B030D-6E8A-4147-A177-3AD203B41FA5}">
+                      <a16:colId xmlns:a16="http://schemas.microsoft.com/office/drawing/2014/main" val="507858612"/>
+                    </a:ext>
+                  </a:extLst>
+                </a:gridCol>
+                <a:gridCol w="5473627">
+                  <a:extLst>
+                    <a:ext uri="{9D8B030D-6E8A-4147-A177-3AD203B41FA5}">
+                      <a16:colId xmlns:a16="http://schemas.microsoft.com/office/drawing/2014/main" val="2069053511"/>
+                    </a:ext>
+                  </a:extLst>
+                </a:gridCol>
+              </a:tblGrid>
+              <a:tr h="2555209">
+                <a:tc>
+                  <a:txBody>
+                    <a:bodyPr/>
+                    <a:lstStyle/>
+                    <a:p>
+                      <a:pPr marL="342900" indent="-342900" algn="l">
+                        <a:buFont typeface="Arial" panose="020B0604020202020204" pitchFamily="34" charset="0"/>
+                        <a:buChar char="•"/>
+                      </a:pPr>
+                      <a:r>
+                        <a:rPr lang="en-CA" dirty="0"/>
+                        <a:t>Set the Canvas size to be 500*500 pixels</a:t>
+                      </a:r>
+                    </a:p>
+                    <a:p>
+                      <a:pPr marL="342900" indent="-342900" algn="l">
+                        <a:buFont typeface="Arial" panose="020B0604020202020204" pitchFamily="34" charset="0"/>
+                        <a:buChar char="•"/>
+                      </a:pPr>
+                      <a:endParaRPr lang="en-CA" dirty="0"/>
+                    </a:p>
+                    <a:p>
+                      <a:pPr marL="342900" indent="-342900" algn="l">
+                        <a:buFont typeface="Arial" panose="020B0604020202020204" pitchFamily="34" charset="0"/>
+                        <a:buChar char="•"/>
+                      </a:pPr>
+                      <a:r>
+                        <a:rPr lang="en-CA" dirty="0"/>
+                        <a:t>Grid of 40*40 with each grid of 12.5 pixels</a:t>
+                      </a:r>
+                    </a:p>
+                    <a:p>
+                      <a:pPr marL="342900" indent="-342900" algn="l">
+                        <a:buFont typeface="Arial" panose="020B0604020202020204" pitchFamily="34" charset="0"/>
+                        <a:buChar char="•"/>
+                      </a:pPr>
+                      <a:endParaRPr lang="en-CA" dirty="0"/>
+                    </a:p>
+                    <a:p>
+                      <a:pPr marL="342900" indent="-342900" algn="l">
+                        <a:buFont typeface="Arial" panose="020B0604020202020204" pitchFamily="34" charset="0"/>
+                        <a:buChar char="•"/>
+                      </a:pPr>
+                      <a:r>
+                        <a:rPr lang="en-CA" dirty="0"/>
+                        <a:t>Starting point : top corner(10,10)</a:t>
+                      </a:r>
+                    </a:p>
+                    <a:p>
+                      <a:pPr marL="342900" indent="-342900" algn="l">
+                        <a:buFont typeface="Arial" panose="020B0604020202020204" pitchFamily="34" charset="0"/>
+                        <a:buChar char="•"/>
+                      </a:pPr>
+                      <a:endParaRPr lang="en-CA" dirty="0"/>
+                    </a:p>
+                    <a:p>
+                      <a:pPr marL="342900" indent="-342900" algn="l">
+                        <a:buFont typeface="Arial" panose="020B0604020202020204" pitchFamily="34" charset="0"/>
+                        <a:buChar char="•"/>
+                      </a:pPr>
+                      <a:r>
+                        <a:rPr lang="en-CA" dirty="0"/>
+                        <a:t>End point : bottom right corner (450, 450)</a:t>
+                      </a:r>
+                    </a:p>
+                    <a:p>
+                      <a:pPr marL="342900" marR="0" lvl="0" indent="-342900" algn="l" defTabSz="457200" rtl="0" eaLnBrk="1" fontAlgn="auto" latinLnBrk="0" hangingPunct="1">
+                        <a:lnSpc>
+                          <a:spcPct val="100000"/>
+                        </a:lnSpc>
+                        <a:spcBef>
+                          <a:spcPts val="0"/>
+                        </a:spcBef>
+                        <a:spcAft>
+                          <a:spcPts val="0"/>
+                        </a:spcAft>
+                        <a:buClrTx/>
+                        <a:buSzTx/>
+                        <a:buFont typeface="Arial" panose="020B0604020202020204" pitchFamily="34" charset="0"/>
+                        <a:buChar char="•"/>
+                        <a:tabLst/>
+                        <a:defRPr/>
+                      </a:pPr>
+                      <a:endParaRPr lang="en-US" b="0" i="0" dirty="0">
+                        <a:effectLst/>
+                        <a:latin typeface="-apple-system"/>
+                      </a:endParaRPr>
+                    </a:p>
+                    <a:p>
+                      <a:pPr marL="342900" marR="0" lvl="0" indent="-342900" algn="l" defTabSz="457200" rtl="0" eaLnBrk="1" fontAlgn="auto" latinLnBrk="0" hangingPunct="1">
+                        <a:lnSpc>
+                          <a:spcPct val="100000"/>
+                        </a:lnSpc>
+                        <a:spcBef>
+                          <a:spcPts val="0"/>
+                        </a:spcBef>
+                        <a:spcAft>
+                          <a:spcPts val="0"/>
+                        </a:spcAft>
+                        <a:buClrTx/>
+                        <a:buSzTx/>
+                        <a:buFont typeface="Arial" panose="020B0604020202020204" pitchFamily="34" charset="0"/>
+                        <a:buChar char="•"/>
+                        <a:tabLst/>
+                        <a:defRPr/>
+                      </a:pPr>
+                      <a:r>
+                        <a:rPr lang="en-US" sz="1800" b="1" kern="1200" dirty="0">
+                          <a:solidFill>
+                            <a:schemeClr val="lt1"/>
+                          </a:solidFill>
+                          <a:latin typeface="+mn-lt"/>
+                          <a:ea typeface="+mn-ea"/>
+                          <a:cs typeface="+mn-cs"/>
+                        </a:rPr>
+                        <a:t>Actions(s): Up, Down, Right and left</a:t>
+                      </a:r>
+                    </a:p>
+                    <a:p>
+                      <a:pPr marL="342900" marR="0" lvl="0" indent="-342900" algn="l" defTabSz="457200" rtl="0" eaLnBrk="1" fontAlgn="auto" latinLnBrk="0" hangingPunct="1">
+                        <a:lnSpc>
+                          <a:spcPct val="100000"/>
+                        </a:lnSpc>
+                        <a:spcBef>
+                          <a:spcPts val="0"/>
+                        </a:spcBef>
+                        <a:spcAft>
+                          <a:spcPts val="0"/>
+                        </a:spcAft>
+                        <a:buClrTx/>
+                        <a:buSzTx/>
+                        <a:buFont typeface="Arial" panose="020B0604020202020204" pitchFamily="34" charset="0"/>
+                        <a:buChar char="•"/>
+                        <a:tabLst/>
+                        <a:defRPr/>
+                      </a:pPr>
+                      <a:endParaRPr lang="en-US" sz="1800" b="1" kern="1200" dirty="0">
+                        <a:solidFill>
+                          <a:schemeClr val="lt1"/>
+                        </a:solidFill>
+                        <a:latin typeface="+mn-lt"/>
+                        <a:ea typeface="+mn-ea"/>
+                        <a:cs typeface="+mn-cs"/>
+                      </a:endParaRPr>
+                    </a:p>
+                  </a:txBody>
+                  <a:tcPr/>
+                </a:tc>
+                <a:tc>
+                  <a:txBody>
+                    <a:bodyPr/>
+                    <a:lstStyle/>
+                    <a:p>
+                      <a:pPr marL="342900" marR="0" lvl="0" indent="-342900" algn="l" defTabSz="457200" rtl="0" eaLnBrk="1" fontAlgn="auto" latinLnBrk="0" hangingPunct="1">
+                        <a:lnSpc>
+                          <a:spcPct val="100000"/>
+                        </a:lnSpc>
+                        <a:spcBef>
+                          <a:spcPts val="0"/>
+                        </a:spcBef>
+                        <a:spcAft>
+                          <a:spcPts val="0"/>
+                        </a:spcAft>
+                        <a:buClrTx/>
+                        <a:buSzTx/>
+                        <a:buFont typeface="Arial" panose="020B0604020202020204" pitchFamily="34" charset="0"/>
+                        <a:buChar char="•"/>
+                        <a:tabLst/>
+                        <a:defRPr/>
+                      </a:pPr>
+                      <a:r>
+                        <a:rPr lang="en-US" sz="1800" b="1" kern="1200" dirty="0">
+                          <a:solidFill>
+                            <a:schemeClr val="lt1"/>
+                          </a:solidFill>
+                          <a:latin typeface="+mn-lt"/>
+                          <a:ea typeface="+mn-ea"/>
+                          <a:cs typeface="+mn-cs"/>
+                        </a:rPr>
+                        <a:t>States: all possible states within a 4 x 4 grid with 0, 1 or 2 obstacles</a:t>
+                      </a:r>
+                    </a:p>
+                    <a:p>
+                      <a:pPr marL="342900" marR="0" lvl="0" indent="-342900" algn="l" defTabSz="457200" rtl="0" eaLnBrk="1" fontAlgn="auto" latinLnBrk="0" hangingPunct="1">
+                        <a:lnSpc>
+                          <a:spcPct val="100000"/>
+                        </a:lnSpc>
+                        <a:spcBef>
+                          <a:spcPts val="0"/>
+                        </a:spcBef>
+                        <a:spcAft>
+                          <a:spcPts val="0"/>
+                        </a:spcAft>
+                        <a:buClrTx/>
+                        <a:buSzTx/>
+                        <a:buFont typeface="Arial" panose="020B0604020202020204" pitchFamily="34" charset="0"/>
+                        <a:buChar char="•"/>
+                        <a:tabLst/>
+                        <a:defRPr/>
+                      </a:pPr>
+                      <a:endParaRPr lang="en-US" sz="1800" b="1" kern="1200" dirty="0">
+                        <a:solidFill>
+                          <a:schemeClr val="lt1"/>
+                        </a:solidFill>
+                        <a:latin typeface="+mn-lt"/>
+                        <a:ea typeface="+mn-ea"/>
+                        <a:cs typeface="+mn-cs"/>
+                      </a:endParaRPr>
+                    </a:p>
+                    <a:p>
+                      <a:pPr marL="342900" marR="0" lvl="0" indent="-342900" algn="l" defTabSz="457200" rtl="0" eaLnBrk="1" fontAlgn="auto" latinLnBrk="0" hangingPunct="1">
+                        <a:lnSpc>
+                          <a:spcPct val="100000"/>
+                        </a:lnSpc>
+                        <a:spcBef>
+                          <a:spcPts val="0"/>
+                        </a:spcBef>
+                        <a:spcAft>
+                          <a:spcPts val="0"/>
+                        </a:spcAft>
+                        <a:buClrTx/>
+                        <a:buSzTx/>
+                        <a:buFont typeface="Arial" panose="020B0604020202020204" pitchFamily="34" charset="0"/>
+                        <a:buChar char="•"/>
+                        <a:tabLst/>
+                        <a:defRPr/>
+                      </a:pPr>
+                      <a:r>
+                        <a:rPr lang="en-US" sz="1800" b="1" kern="1200" dirty="0">
+                          <a:solidFill>
+                            <a:schemeClr val="lt1"/>
+                          </a:solidFill>
+                          <a:latin typeface="+mn-lt"/>
+                          <a:ea typeface="+mn-ea"/>
+                          <a:cs typeface="+mn-cs"/>
+                        </a:rPr>
+                        <a:t>T(</a:t>
+                      </a:r>
+                      <a:r>
+                        <a:rPr lang="en-US" sz="1800" b="1" kern="1200" dirty="0" err="1">
+                          <a:solidFill>
+                            <a:schemeClr val="lt1"/>
+                          </a:solidFill>
+                          <a:latin typeface="+mn-lt"/>
+                          <a:ea typeface="+mn-ea"/>
+                          <a:cs typeface="+mn-cs"/>
+                        </a:rPr>
+                        <a:t>s'|s</a:t>
+                      </a:r>
+                      <a:r>
+                        <a:rPr lang="en-US" sz="1800" b="1" kern="1200" dirty="0">
+                          <a:solidFill>
+                            <a:schemeClr val="lt1"/>
+                          </a:solidFill>
+                          <a:latin typeface="+mn-lt"/>
+                          <a:ea typeface="+mn-ea"/>
+                          <a:cs typeface="+mn-cs"/>
+                        </a:rPr>
+                        <a:t>; a): probability of s0 if take action a in state s = 1 (No uncertainty)</a:t>
+                      </a:r>
+                    </a:p>
+                    <a:p>
+                      <a:pPr marL="342900" marR="0" lvl="0" indent="-342900" algn="l" defTabSz="457200" rtl="0" eaLnBrk="1" fontAlgn="auto" latinLnBrk="0" hangingPunct="1">
+                        <a:lnSpc>
+                          <a:spcPct val="100000"/>
+                        </a:lnSpc>
+                        <a:spcBef>
+                          <a:spcPts val="0"/>
+                        </a:spcBef>
+                        <a:spcAft>
+                          <a:spcPts val="0"/>
+                        </a:spcAft>
+                        <a:buClrTx/>
+                        <a:buSzTx/>
+                        <a:buFont typeface="Arial" panose="020B0604020202020204" pitchFamily="34" charset="0"/>
+                        <a:buChar char="•"/>
+                        <a:tabLst/>
+                        <a:defRPr/>
+                      </a:pPr>
+                      <a:endParaRPr lang="en-US" sz="1800" b="1" kern="1200" dirty="0">
+                        <a:solidFill>
+                          <a:schemeClr val="lt1"/>
+                        </a:solidFill>
+                        <a:latin typeface="+mn-lt"/>
+                        <a:ea typeface="+mn-ea"/>
+                        <a:cs typeface="+mn-cs"/>
+                      </a:endParaRPr>
+                    </a:p>
+                    <a:p>
+                      <a:pPr marL="342900" marR="0" lvl="0" indent="-342900" algn="l" defTabSz="457200" rtl="0" eaLnBrk="1" fontAlgn="auto" latinLnBrk="0" hangingPunct="1">
+                        <a:lnSpc>
+                          <a:spcPct val="100000"/>
+                        </a:lnSpc>
+                        <a:spcBef>
+                          <a:spcPts val="0"/>
+                        </a:spcBef>
+                        <a:spcAft>
+                          <a:spcPts val="0"/>
+                        </a:spcAft>
+                        <a:buClrTx/>
+                        <a:buSzTx/>
+                        <a:buFont typeface="Arial" panose="020B0604020202020204" pitchFamily="34" charset="0"/>
+                        <a:buChar char="•"/>
+                        <a:tabLst/>
+                        <a:defRPr/>
+                      </a:pPr>
+                      <a:r>
+                        <a:rPr lang="en-US" sz="1800" b="1" kern="1200" dirty="0">
+                          <a:solidFill>
+                            <a:schemeClr val="lt1"/>
+                          </a:solidFill>
+                          <a:latin typeface="+mn-lt"/>
+                          <a:ea typeface="+mn-ea"/>
+                          <a:cs typeface="+mn-cs"/>
+                        </a:rPr>
+                        <a:t>Reward(s; a; s0): -1 without obstacle, -5 when there is an obstacle</a:t>
+                      </a:r>
+                    </a:p>
+                    <a:p>
+                      <a:pPr marL="342900" marR="0" lvl="0" indent="-342900" algn="l" defTabSz="457200" rtl="0" eaLnBrk="1" fontAlgn="auto" latinLnBrk="0" hangingPunct="1">
+                        <a:lnSpc>
+                          <a:spcPct val="100000"/>
+                        </a:lnSpc>
+                        <a:spcBef>
+                          <a:spcPts val="0"/>
+                        </a:spcBef>
+                        <a:spcAft>
+                          <a:spcPts val="0"/>
+                        </a:spcAft>
+                        <a:buClrTx/>
+                        <a:buSzTx/>
+                        <a:buFont typeface="Arial" panose="020B0604020202020204" pitchFamily="34" charset="0"/>
+                        <a:buChar char="•"/>
+                        <a:tabLst/>
+                        <a:defRPr/>
+                      </a:pPr>
+                      <a:r>
+                        <a:rPr lang="en-US" sz="1800" b="1" kern="1200" dirty="0">
+                          <a:solidFill>
+                            <a:schemeClr val="lt1"/>
+                          </a:solidFill>
+                          <a:latin typeface="+mn-lt"/>
+                          <a:ea typeface="+mn-ea"/>
+                          <a:cs typeface="+mn-cs"/>
+                        </a:rPr>
+                        <a:t>500 </a:t>
+                      </a:r>
+                    </a:p>
+                    <a:p>
+                      <a:pPr algn="l"/>
+                      <a:endParaRPr lang="en-CA" dirty="0"/>
+                    </a:p>
+                  </a:txBody>
+                  <a:tcPr/>
+                </a:tc>
+                <a:extLst>
+                  <a:ext uri="{0D108BD9-81ED-4DB2-BD59-A6C34878D82A}">
+                    <a16:rowId xmlns:a16="http://schemas.microsoft.com/office/drawing/2014/main" val="1550774782"/>
+                  </a:ext>
+                </a:extLst>
+              </a:tr>
+            </a:tbl>
+          </a:graphicData>
+        </a:graphic>
+      </p:graphicFrame>
+      <p:pic>
+        <p:nvPicPr>
+          <p:cNvPr id="22" name="Picture 21" descr="A close up of a screen&#10;&#10;Description automatically generated">
+            <a:extLst>
+              <a:ext uri="{FF2B5EF4-FFF2-40B4-BE49-F238E27FC236}">
+                <a16:creationId xmlns:a16="http://schemas.microsoft.com/office/drawing/2014/main" id="{DA3C3760-16FD-4249-B653-F94FBA822CCB}"/>
+              </a:ext>
+            </a:extLst>
+          </p:cNvPr>
+          <p:cNvPicPr>
+            <a:picLocks noChangeAspect="1"/>
+          </p:cNvPicPr>
+          <p:nvPr/>
+        </p:nvPicPr>
+        <p:blipFill>
+          <a:blip r:embed="rId2"/>
+          <a:stretch>
+            <a:fillRect/>
+          </a:stretch>
+        </p:blipFill>
+        <p:spPr>
+          <a:xfrm>
+            <a:off x="1127292" y="4183214"/>
+            <a:ext cx="2836986" cy="2562122"/>
+          </a:xfrm>
+          <a:prstGeom prst="rect">
+            <a:avLst/>
+          </a:prstGeom>
+        </p:spPr>
+      </p:pic>
+      <p:pic>
+        <p:nvPicPr>
+          <p:cNvPr id="26" name="Picture 25" descr="A picture containing clock&#10;&#10;Description automatically generated">
+            <a:extLst>
+              <a:ext uri="{FF2B5EF4-FFF2-40B4-BE49-F238E27FC236}">
+                <a16:creationId xmlns:a16="http://schemas.microsoft.com/office/drawing/2014/main" id="{8082E3E4-ECDE-43B9-989F-8FF5F9F43240}"/>
+              </a:ext>
+            </a:extLst>
+          </p:cNvPr>
+          <p:cNvPicPr>
+            <a:picLocks noChangeAspect="1"/>
+          </p:cNvPicPr>
+          <p:nvPr/>
+        </p:nvPicPr>
+        <p:blipFill>
+          <a:blip r:embed="rId3"/>
+          <a:stretch>
+            <a:fillRect/>
+          </a:stretch>
+        </p:blipFill>
+        <p:spPr>
+          <a:xfrm>
+            <a:off x="3964278" y="4541271"/>
+            <a:ext cx="6972535" cy="1846007"/>
+          </a:xfrm>
+          <a:prstGeom prst="rect">
+            <a:avLst/>
+          </a:prstGeom>
+        </p:spPr>
+      </p:pic>
+      <p:sp>
+        <p:nvSpPr>
+          <p:cNvPr id="27" name="TextBox 26">
+            <a:extLst>
+              <a:ext uri="{FF2B5EF4-FFF2-40B4-BE49-F238E27FC236}">
+                <a16:creationId xmlns:a16="http://schemas.microsoft.com/office/drawing/2014/main" id="{CFC73A31-9EFC-49C9-8456-AE967296878D}"/>
+              </a:ext>
+            </a:extLst>
+          </p:cNvPr>
+          <p:cNvSpPr txBox="1"/>
+          <p:nvPr/>
+        </p:nvSpPr>
+        <p:spPr>
+          <a:xfrm>
+            <a:off x="3532478" y="4356605"/>
+            <a:ext cx="4239922" cy="369332"/>
+          </a:xfrm>
+          <a:prstGeom prst="rect">
+            <a:avLst/>
+          </a:prstGeom>
+          <a:noFill/>
+        </p:spPr>
+        <p:txBody>
+          <a:bodyPr wrap="square" rtlCol="0">
+            <a:spAutoFit/>
+          </a:bodyPr>
+          <a:lstStyle/>
+          <a:p>
+            <a:r>
+              <a:rPr lang="en-CA" dirty="0"/>
+              <a:t>One grid - matrix with 2 possible obstacle</a:t>
+            </a:r>
+          </a:p>
+        </p:txBody>
+      </p:sp>
+    </p:spTree>
+    <p:extLst>
+      <p:ext uri="{BB962C8B-B14F-4D97-AF65-F5344CB8AC3E}">
+        <p14:creationId xmlns:p14="http://schemas.microsoft.com/office/powerpoint/2010/main" val="1199843884"/>
+      </p:ext>
+    </p:extLst>
+  </p:cSld>
+  <p:clrMapOvr>
+    <a:masterClrMapping/>
+  </p:clrMapOvr>
+</p:sld>
+</file>
+
+<file path=ppt/slides/slide5.xml><?xml version="1.0" encoding="utf-8"?>
+<p:sld xmlns:a="http://schemas.openxmlformats.org/drawingml/2006/main" xmlns:r="http://schemas.openxmlformats.org/officeDocument/2006/relationships" xmlns:p="http://schemas.openxmlformats.org/presentationml/2006/main">
+  <p:cSld>
+    <p:spTree>
+      <p:nvGrpSpPr>
+        <p:cNvPr id="1" name=""/>
+        <p:cNvGrpSpPr/>
+        <p:nvPr/>
+      </p:nvGrpSpPr>
+      <p:grpSpPr>
+        <a:xfrm>
+          <a:off x="0" y="0"/>
+          <a:ext cx="0" cy="0"/>
+          <a:chOff x="0" y="0"/>
+          <a:chExt cx="0" cy="0"/>
+        </a:xfrm>
+      </p:grpSpPr>
+      <p:sp>
+        <p:nvSpPr>
+          <p:cNvPr id="2" name="Title 1">
+            <a:extLst>
+              <a:ext uri="{FF2B5EF4-FFF2-40B4-BE49-F238E27FC236}">
+                <a16:creationId xmlns:a16="http://schemas.microsoft.com/office/drawing/2014/main" id="{315BD2A4-493A-43DE-8F94-D2877F812260}"/>
+              </a:ext>
+            </a:extLst>
+          </p:cNvPr>
+          <p:cNvSpPr>
+            <a:spLocks noGrp="1"/>
+          </p:cNvSpPr>
+          <p:nvPr>
+            <p:ph type="title"/>
+          </p:nvPr>
+        </p:nvSpPr>
+        <p:spPr>
+          <a:xfrm>
+            <a:off x="581192" y="702156"/>
+            <a:ext cx="11029616" cy="646420"/>
+          </a:xfrm>
+        </p:spPr>
+        <p:txBody>
+          <a:bodyPr/>
+          <a:lstStyle/>
+          <a:p>
+            <a:r>
+              <a:rPr lang="en-CA" dirty="0"/>
+              <a:t>algorithm – 1 (static policy) : Bayesian + static</a:t>
             </a:r>
           </a:p>
         </p:txBody>
@@ -5513,7 +6076,7 @@
 </p:sld>
 </file>
 
-<file path=ppt/slides/slide5.xml><?xml version="1.0" encoding="utf-8"?>
+<file path=ppt/slides/slide6.xml><?xml version="1.0" encoding="utf-8"?>
 <p:sld xmlns:a="http://schemas.openxmlformats.org/drawingml/2006/main" xmlns:r="http://schemas.openxmlformats.org/officeDocument/2006/relationships" xmlns:p="http://schemas.openxmlformats.org/presentationml/2006/main">
   <p:cSld>
     <p:spTree>
@@ -5558,8 +6121,13 @@
           <a:p>
             <a:r>
               <a:rPr lang="en-CA" dirty="0"/>
-              <a:t>Approach - 2</a:t>
-            </a:r>
+              <a:t>algorithm – 2 (Dynamic policy) - </a:t>
+            </a:r>
+            <a:r>
+              <a:rPr lang="en-CA" dirty="0" err="1"/>
+              <a:t>BAyesian</a:t>
+            </a:r>
+            <a:endParaRPr lang="en-CA" dirty="0"/>
           </a:p>
         </p:txBody>
       </p:sp>
@@ -5844,7 +6412,7 @@
 </p:sld>
 </file>
 
-<file path=ppt/slides/slide6.xml><?xml version="1.0" encoding="utf-8"?>
+<file path=ppt/slides/slide7.xml><?xml version="1.0" encoding="utf-8"?>
 <p:sld xmlns:a="http://schemas.openxmlformats.org/drawingml/2006/main" xmlns:r="http://schemas.openxmlformats.org/officeDocument/2006/relationships" xmlns:p="http://schemas.openxmlformats.org/presentationml/2006/main">
   <p:cSld>
     <p:spTree>
@@ -5889,8 +6457,429 @@
           <a:p>
             <a:r>
               <a:rPr lang="en-CA" dirty="0"/>
-              <a:t>Conclusion</a:t>
-            </a:r>
+              <a:t>algorithm – 3 (</a:t>
+            </a:r>
+            <a:r>
+              <a:rPr lang="en-CA" dirty="0" err="1"/>
+              <a:t>HyBrid</a:t>
+            </a:r>
+            <a:r>
+              <a:rPr lang="en-CA" dirty="0"/>
+              <a:t> - Bayesian and Dynamic policy)</a:t>
+            </a:r>
+          </a:p>
+        </p:txBody>
+      </p:sp>
+      <p:sp>
+        <p:nvSpPr>
+          <p:cNvPr id="3" name="Content Placeholder 2">
+            <a:extLst>
+              <a:ext uri="{FF2B5EF4-FFF2-40B4-BE49-F238E27FC236}">
+                <a16:creationId xmlns:a16="http://schemas.microsoft.com/office/drawing/2014/main" id="{5BA6CD0A-3896-42CE-AE92-3B0BA8764370}"/>
+              </a:ext>
+            </a:extLst>
+          </p:cNvPr>
+          <p:cNvSpPr>
+            <a:spLocks noGrp="1"/>
+          </p:cNvSpPr>
+          <p:nvPr>
+            <p:ph idx="1"/>
+          </p:nvPr>
+        </p:nvSpPr>
+        <p:spPr>
+          <a:xfrm>
+            <a:off x="581192" y="3342289"/>
+            <a:ext cx="11029615" cy="2633061"/>
+          </a:xfrm>
+        </p:spPr>
+        <p:txBody>
+          <a:bodyPr anchor="t"/>
+          <a:lstStyle/>
+          <a:p>
+            <a:pPr marL="0" indent="0">
+              <a:buNone/>
+            </a:pPr>
+            <a:r>
+              <a:rPr lang="en-CA" dirty="0"/>
+              <a:t>Find the optimal path for robot to reach an end point (goal state) while avoiding randomly generated obstacles in a 2D space</a:t>
+            </a:r>
+          </a:p>
+          <a:p>
+            <a:pPr marL="0" indent="0">
+              <a:buNone/>
+            </a:pPr>
+            <a:endParaRPr lang="en-CA" dirty="0"/>
+          </a:p>
+        </p:txBody>
+      </p:sp>
+      <p:graphicFrame>
+        <p:nvGraphicFramePr>
+          <p:cNvPr id="5" name="Table 4">
+            <a:extLst>
+              <a:ext uri="{FF2B5EF4-FFF2-40B4-BE49-F238E27FC236}">
+                <a16:creationId xmlns:a16="http://schemas.microsoft.com/office/drawing/2014/main" id="{BFC19AC6-6895-4B65-8744-43C91BA5ED44}"/>
+              </a:ext>
+            </a:extLst>
+          </p:cNvPr>
+          <p:cNvGraphicFramePr>
+            <a:graphicFrameLocks noGrp="1"/>
+          </p:cNvGraphicFramePr>
+          <p:nvPr/>
+        </p:nvGraphicFramePr>
+        <p:xfrm>
+          <a:off x="581192" y="1348576"/>
+          <a:ext cx="10947254" cy="1737360"/>
+        </p:xfrm>
+        <a:graphic>
+          <a:graphicData uri="http://schemas.openxmlformats.org/drawingml/2006/table">
+            <a:tbl>
+              <a:tblPr firstRow="1" bandRow="1">
+                <a:tableStyleId>{5C22544A-7EE6-4342-B048-85BDC9FD1C3A}</a:tableStyleId>
+              </a:tblPr>
+              <a:tblGrid>
+                <a:gridCol w="5473627">
+                  <a:extLst>
+                    <a:ext uri="{9D8B030D-6E8A-4147-A177-3AD203B41FA5}">
+                      <a16:colId xmlns:a16="http://schemas.microsoft.com/office/drawing/2014/main" val="507858612"/>
+                    </a:ext>
+                  </a:extLst>
+                </a:gridCol>
+                <a:gridCol w="5473627">
+                  <a:extLst>
+                    <a:ext uri="{9D8B030D-6E8A-4147-A177-3AD203B41FA5}">
+                      <a16:colId xmlns:a16="http://schemas.microsoft.com/office/drawing/2014/main" val="2069053511"/>
+                    </a:ext>
+                  </a:extLst>
+                </a:gridCol>
+              </a:tblGrid>
+              <a:tr h="749680">
+                <a:tc>
+                  <a:txBody>
+                    <a:bodyPr/>
+                    <a:lstStyle/>
+                    <a:p>
+                      <a:pPr marL="342900" indent="-342900" algn="l">
+                        <a:buFont typeface="Arial" panose="020B0604020202020204" pitchFamily="34" charset="0"/>
+                        <a:buChar char="•"/>
+                      </a:pPr>
+                      <a:r>
+                        <a:rPr lang="en-CA" dirty="0"/>
+                        <a:t>500*500 pixels</a:t>
+                      </a:r>
+                    </a:p>
+                    <a:p>
+                      <a:pPr marL="342900" indent="-342900" algn="l">
+                        <a:buFont typeface="Arial" panose="020B0604020202020204" pitchFamily="34" charset="0"/>
+                        <a:buChar char="•"/>
+                      </a:pPr>
+                      <a:r>
+                        <a:rPr lang="en-CA" dirty="0"/>
+                        <a:t>Starting point : top corner(10,10)</a:t>
+                      </a:r>
+                    </a:p>
+                    <a:p>
+                      <a:pPr marL="342900" indent="-342900" algn="l">
+                        <a:buFont typeface="Arial" panose="020B0604020202020204" pitchFamily="34" charset="0"/>
+                        <a:buChar char="•"/>
+                      </a:pPr>
+                      <a:r>
+                        <a:rPr lang="en-CA" dirty="0"/>
+                        <a:t>End point : bottom right corner (450, 450)</a:t>
+                      </a:r>
+                    </a:p>
+                    <a:p>
+                      <a:pPr marL="342900" marR="0" lvl="0" indent="-342900" algn="l" defTabSz="457200" rtl="0" eaLnBrk="1" fontAlgn="auto" latinLnBrk="0" hangingPunct="1">
+                        <a:lnSpc>
+                          <a:spcPct val="100000"/>
+                        </a:lnSpc>
+                        <a:spcBef>
+                          <a:spcPts val="0"/>
+                        </a:spcBef>
+                        <a:spcAft>
+                          <a:spcPts val="0"/>
+                        </a:spcAft>
+                        <a:buClrTx/>
+                        <a:buSzTx/>
+                        <a:buFont typeface="Arial" panose="020B0604020202020204" pitchFamily="34" charset="0"/>
+                        <a:buChar char="•"/>
+                        <a:tabLst/>
+                        <a:defRPr/>
+                      </a:pPr>
+                      <a:r>
+                        <a:rPr lang="en-US" b="0" i="0" dirty="0">
+                          <a:effectLst/>
+                          <a:latin typeface="-apple-system"/>
+                        </a:rPr>
+                        <a:t>Actions(s): Up, Down, Right and left</a:t>
+                      </a:r>
+                    </a:p>
+                    <a:p>
+                      <a:pPr marL="342900" marR="0" lvl="0" indent="-342900" algn="l" defTabSz="457200" rtl="0" eaLnBrk="1" fontAlgn="auto" latinLnBrk="0" hangingPunct="1">
+                        <a:lnSpc>
+                          <a:spcPct val="100000"/>
+                        </a:lnSpc>
+                        <a:spcBef>
+                          <a:spcPts val="0"/>
+                        </a:spcBef>
+                        <a:spcAft>
+                          <a:spcPts val="0"/>
+                        </a:spcAft>
+                        <a:buClrTx/>
+                        <a:buSzTx/>
+                        <a:buFont typeface="Arial" panose="020B0604020202020204" pitchFamily="34" charset="0"/>
+                        <a:buChar char="•"/>
+                        <a:tabLst/>
+                        <a:defRPr/>
+                      </a:pPr>
+                      <a:r>
+                        <a:rPr lang="en-US" b="0" i="0" dirty="0">
+                          <a:effectLst/>
+                          <a:latin typeface="-apple-system"/>
+                        </a:rPr>
+                        <a:t>States: all possible states within a 4 x 4 grid with 0, 1 or 2 obstacles</a:t>
+                      </a:r>
+                      <a:endParaRPr lang="en-CA" dirty="0"/>
+                    </a:p>
+                  </a:txBody>
+                  <a:tcPr/>
+                </a:tc>
+                <a:tc>
+                  <a:txBody>
+                    <a:bodyPr/>
+                    <a:lstStyle/>
+                    <a:p>
+                      <a:pPr marL="342900" indent="-342900" algn="l">
+                        <a:buFont typeface="Arial" panose="020B0604020202020204" pitchFamily="34" charset="0"/>
+                        <a:buChar char="•"/>
+                      </a:pPr>
+                      <a:r>
+                        <a:rPr lang="en-US" b="0" i="0" dirty="0">
+                          <a:effectLst/>
+                          <a:latin typeface="-apple-system"/>
+                        </a:rPr>
+                        <a:t>T(</a:t>
+                      </a:r>
+                      <a:r>
+                        <a:rPr lang="en-US" b="0" i="0" dirty="0" err="1">
+                          <a:effectLst/>
+                          <a:latin typeface="-apple-system"/>
+                        </a:rPr>
+                        <a:t>s'|s</a:t>
+                      </a:r>
+                      <a:r>
+                        <a:rPr lang="en-US" b="0" i="0" dirty="0">
+                          <a:effectLst/>
+                          <a:latin typeface="-apple-system"/>
+                        </a:rPr>
+                        <a:t>; a): probability of s0 if take action a in state s = 1 (No uncertainty)</a:t>
+                      </a:r>
+                    </a:p>
+                    <a:p>
+                      <a:pPr marL="342900" indent="-342900" algn="l">
+                        <a:buFont typeface="Arial" panose="020B0604020202020204" pitchFamily="34" charset="0"/>
+                        <a:buChar char="•"/>
+                      </a:pPr>
+                      <a:r>
+                        <a:rPr lang="en-US" b="0" i="0" dirty="0">
+                          <a:effectLst/>
+                          <a:latin typeface="-apple-system"/>
+                        </a:rPr>
+                        <a:t>Reward(s; a; s0): -1 without </a:t>
+                      </a:r>
+                      <a:r>
+                        <a:rPr lang="en-US" b="0" i="0" dirty="0" err="1">
+                          <a:effectLst/>
+                          <a:latin typeface="-apple-system"/>
+                        </a:rPr>
+                        <a:t>obsctacle</a:t>
+                      </a:r>
+                      <a:r>
+                        <a:rPr lang="en-US" b="0" i="0" dirty="0">
+                          <a:effectLst/>
+                          <a:latin typeface="-apple-system"/>
+                        </a:rPr>
+                        <a:t>, -5 when there is an obstacle</a:t>
+                      </a:r>
+                    </a:p>
+                    <a:p>
+                      <a:pPr marL="342900" indent="-342900" algn="l">
+                        <a:buFont typeface="Arial" panose="020B0604020202020204" pitchFamily="34" charset="0"/>
+                        <a:buChar char="•"/>
+                      </a:pPr>
+                      <a:r>
+                        <a:rPr lang="en-US" b="0" i="0" dirty="0">
+                          <a:effectLst/>
+                          <a:latin typeface="-apple-system"/>
+                        </a:rPr>
+                        <a:t>Discount factor = 0.6</a:t>
+                      </a:r>
+                      <a:endParaRPr lang="en-CA" dirty="0"/>
+                    </a:p>
+                    <a:p>
+                      <a:pPr algn="l"/>
+                      <a:endParaRPr lang="en-CA" dirty="0"/>
+                    </a:p>
+                  </a:txBody>
+                  <a:tcPr/>
+                </a:tc>
+                <a:extLst>
+                  <a:ext uri="{0D108BD9-81ED-4DB2-BD59-A6C34878D82A}">
+                    <a16:rowId xmlns:a16="http://schemas.microsoft.com/office/drawing/2014/main" val="1550774782"/>
+                  </a:ext>
+                </a:extLst>
+              </a:tr>
+            </a:tbl>
+          </a:graphicData>
+        </a:graphic>
+      </p:graphicFrame>
+    </p:spTree>
+    <p:extLst>
+      <p:ext uri="{BB962C8B-B14F-4D97-AF65-F5344CB8AC3E}">
+        <p14:creationId xmlns:p14="http://schemas.microsoft.com/office/powerpoint/2010/main" val="1770927102"/>
+      </p:ext>
+    </p:extLst>
+  </p:cSld>
+  <p:clrMapOvr>
+    <a:masterClrMapping/>
+  </p:clrMapOvr>
+</p:sld>
+</file>
+
+<file path=ppt/slides/slide8.xml><?xml version="1.0" encoding="utf-8"?>
+<p:sld xmlns:a="http://schemas.openxmlformats.org/drawingml/2006/main" xmlns:r="http://schemas.openxmlformats.org/officeDocument/2006/relationships" xmlns:p="http://schemas.openxmlformats.org/presentationml/2006/main">
+  <p:cSld>
+    <p:spTree>
+      <p:nvGrpSpPr>
+        <p:cNvPr id="1" name=""/>
+        <p:cNvGrpSpPr/>
+        <p:nvPr/>
+      </p:nvGrpSpPr>
+      <p:grpSpPr>
+        <a:xfrm>
+          <a:off x="0" y="0"/>
+          <a:ext cx="0" cy="0"/>
+          <a:chOff x="0" y="0"/>
+          <a:chExt cx="0" cy="0"/>
+        </a:xfrm>
+      </p:grpSpPr>
+      <p:sp>
+        <p:nvSpPr>
+          <p:cNvPr id="2" name="Title 1">
+            <a:extLst>
+              <a:ext uri="{FF2B5EF4-FFF2-40B4-BE49-F238E27FC236}">
+                <a16:creationId xmlns:a16="http://schemas.microsoft.com/office/drawing/2014/main" id="{ADE937BC-31AD-49C7-ADFE-56EE65697C84}"/>
+              </a:ext>
+            </a:extLst>
+          </p:cNvPr>
+          <p:cNvSpPr>
+            <a:spLocks noGrp="1"/>
+          </p:cNvSpPr>
+          <p:nvPr>
+            <p:ph type="title"/>
+          </p:nvPr>
+        </p:nvSpPr>
+        <p:spPr/>
+        <p:txBody>
+          <a:bodyPr/>
+          <a:lstStyle/>
+          <a:p>
+            <a:r>
+              <a:rPr lang="en-CA" dirty="0"/>
+              <a:t>Performance Slides</a:t>
+            </a:r>
+          </a:p>
+        </p:txBody>
+      </p:sp>
+      <p:sp>
+        <p:nvSpPr>
+          <p:cNvPr id="3" name="Content Placeholder 2">
+            <a:extLst>
+              <a:ext uri="{FF2B5EF4-FFF2-40B4-BE49-F238E27FC236}">
+                <a16:creationId xmlns:a16="http://schemas.microsoft.com/office/drawing/2014/main" id="{4BEE5E90-810D-4DDE-8AD4-07571F9D430F}"/>
+              </a:ext>
+            </a:extLst>
+          </p:cNvPr>
+          <p:cNvSpPr>
+            <a:spLocks noGrp="1"/>
+          </p:cNvSpPr>
+          <p:nvPr>
+            <p:ph idx="1"/>
+          </p:nvPr>
+        </p:nvSpPr>
+        <p:spPr/>
+        <p:txBody>
+          <a:bodyPr/>
+          <a:lstStyle/>
+          <a:p>
+            <a:endParaRPr lang="en-CA"/>
+          </a:p>
+        </p:txBody>
+      </p:sp>
+    </p:spTree>
+    <p:extLst>
+      <p:ext uri="{BB962C8B-B14F-4D97-AF65-F5344CB8AC3E}">
+        <p14:creationId xmlns:p14="http://schemas.microsoft.com/office/powerpoint/2010/main" val="1704082888"/>
+      </p:ext>
+    </p:extLst>
+  </p:cSld>
+  <p:clrMapOvr>
+    <a:masterClrMapping/>
+  </p:clrMapOvr>
+</p:sld>
+</file>
+
+<file path=ppt/slides/slide9.xml><?xml version="1.0" encoding="utf-8"?>
+<p:sld xmlns:a="http://schemas.openxmlformats.org/drawingml/2006/main" xmlns:r="http://schemas.openxmlformats.org/officeDocument/2006/relationships" xmlns:p="http://schemas.openxmlformats.org/presentationml/2006/main">
+  <p:cSld>
+    <p:spTree>
+      <p:nvGrpSpPr>
+        <p:cNvPr id="1" name=""/>
+        <p:cNvGrpSpPr/>
+        <p:nvPr/>
+      </p:nvGrpSpPr>
+      <p:grpSpPr>
+        <a:xfrm>
+          <a:off x="0" y="0"/>
+          <a:ext cx="0" cy="0"/>
+          <a:chOff x="0" y="0"/>
+          <a:chExt cx="0" cy="0"/>
+        </a:xfrm>
+      </p:grpSpPr>
+      <p:sp>
+        <p:nvSpPr>
+          <p:cNvPr id="2" name="Title 1">
+            <a:extLst>
+              <a:ext uri="{FF2B5EF4-FFF2-40B4-BE49-F238E27FC236}">
+                <a16:creationId xmlns:a16="http://schemas.microsoft.com/office/drawing/2014/main" id="{315BD2A4-493A-43DE-8F94-D2877F812260}"/>
+              </a:ext>
+            </a:extLst>
+          </p:cNvPr>
+          <p:cNvSpPr>
+            <a:spLocks noGrp="1"/>
+          </p:cNvSpPr>
+          <p:nvPr>
+            <p:ph type="title"/>
+          </p:nvPr>
+        </p:nvSpPr>
+        <p:spPr>
+          <a:xfrm>
+            <a:off x="581192" y="702156"/>
+            <a:ext cx="11029616" cy="646420"/>
+          </a:xfrm>
+        </p:spPr>
+        <p:txBody>
+          <a:bodyPr/>
+          <a:lstStyle/>
+          <a:p>
+            <a:r>
+              <a:rPr lang="en-CA" dirty="0"/>
+              <a:t>Conclusion – Lesson Learnt </a:t>
+            </a:r>
+            <a:r>
+              <a:rPr lang="en-CA"/>
+              <a:t>and future work</a:t>
+            </a:r>
+            <a:endParaRPr lang="en-CA" dirty="0"/>
           </a:p>
         </p:txBody>
       </p:sp>

</xml_diff>